<commit_message>
Updated files to final versions
</commit_message>
<xml_diff>
--- a/turtle_games_Alex_Nott_presentation.pptx
+++ b/turtle_games_Alex_Nott_presentation.pptx
@@ -136,7 +136,7 @@
   <pc:docChgLst>
     <pc:chgData name="Alex Nott" userId="1c211493c69eb70a" providerId="LiveId" clId="{C1A48B65-1002-47BE-BB40-52F466E86963}"/>
     <pc:docChg chg="undo custSel addSld delSld modSld sldOrd">
-      <pc:chgData name="Alex Nott" userId="1c211493c69eb70a" providerId="LiveId" clId="{C1A48B65-1002-47BE-BB40-52F466E86963}" dt="2023-07-22T11:09:51.665" v="12758" actId="20577"/>
+      <pc:chgData name="Alex Nott" userId="1c211493c69eb70a" providerId="LiveId" clId="{C1A48B65-1002-47BE-BB40-52F466E86963}" dt="2023-07-24T08:29:37.159" v="12761" actId="20577"/>
       <pc:docMkLst>
         <pc:docMk/>
       </pc:docMkLst>
@@ -464,7 +464,7 @@
         </pc:picChg>
       </pc:sldChg>
       <pc:sldChg chg="addSp delSp modSp add mod">
-        <pc:chgData name="Alex Nott" userId="1c211493c69eb70a" providerId="LiveId" clId="{C1A48B65-1002-47BE-BB40-52F466E86963}" dt="2023-07-22T11:08:53.335" v="12710" actId="20577"/>
+        <pc:chgData name="Alex Nott" userId="1c211493c69eb70a" providerId="LiveId" clId="{C1A48B65-1002-47BE-BB40-52F466E86963}" dt="2023-07-24T08:29:37.159" v="12761" actId="20577"/>
         <pc:sldMkLst>
           <pc:docMk/>
           <pc:sldMk cId="388798145" sldId="261"/>
@@ -478,7 +478,7 @@
           </ac:spMkLst>
         </pc:spChg>
         <pc:spChg chg="mod">
-          <ac:chgData name="Alex Nott" userId="1c211493c69eb70a" providerId="LiveId" clId="{C1A48B65-1002-47BE-BB40-52F466E86963}" dt="2023-07-22T11:08:53.335" v="12710" actId="20577"/>
+          <ac:chgData name="Alex Nott" userId="1c211493c69eb70a" providerId="LiveId" clId="{C1A48B65-1002-47BE-BB40-52F466E86963}" dt="2023-07-24T08:29:37.159" v="12761" actId="20577"/>
           <ac:spMkLst>
             <pc:docMk/>
             <pc:sldMk cId="388798145" sldId="261"/>
@@ -1474,7 +1474,7 @@
           <a:p>
             <a:fld id="{B3CC3E4E-7464-425B-BD5C-16AB80441681}" type="datetimeFigureOut">
               <a:rPr lang="en-GB" smtClean="0"/>
-              <a:t>22/07/2023</a:t>
+              <a:t>24/07/2023</a:t>
             </a:fld>
             <a:endParaRPr lang="en-GB"/>
           </a:p>
@@ -1674,7 +1674,7 @@
           <a:p>
             <a:fld id="{B3CC3E4E-7464-425B-BD5C-16AB80441681}" type="datetimeFigureOut">
               <a:rPr lang="en-GB" smtClean="0"/>
-              <a:t>22/07/2023</a:t>
+              <a:t>24/07/2023</a:t>
             </a:fld>
             <a:endParaRPr lang="en-GB"/>
           </a:p>
@@ -1884,7 +1884,7 @@
           <a:p>
             <a:fld id="{B3CC3E4E-7464-425B-BD5C-16AB80441681}" type="datetimeFigureOut">
               <a:rPr lang="en-GB" smtClean="0"/>
-              <a:t>22/07/2023</a:t>
+              <a:t>24/07/2023</a:t>
             </a:fld>
             <a:endParaRPr lang="en-GB"/>
           </a:p>
@@ -2084,7 +2084,7 @@
           <a:p>
             <a:fld id="{B3CC3E4E-7464-425B-BD5C-16AB80441681}" type="datetimeFigureOut">
               <a:rPr lang="en-GB" smtClean="0"/>
-              <a:t>22/07/2023</a:t>
+              <a:t>24/07/2023</a:t>
             </a:fld>
             <a:endParaRPr lang="en-GB"/>
           </a:p>
@@ -2360,7 +2360,7 @@
           <a:p>
             <a:fld id="{B3CC3E4E-7464-425B-BD5C-16AB80441681}" type="datetimeFigureOut">
               <a:rPr lang="en-GB" smtClean="0"/>
-              <a:t>22/07/2023</a:t>
+              <a:t>24/07/2023</a:t>
             </a:fld>
             <a:endParaRPr lang="en-GB"/>
           </a:p>
@@ -2628,7 +2628,7 @@
           <a:p>
             <a:fld id="{B3CC3E4E-7464-425B-BD5C-16AB80441681}" type="datetimeFigureOut">
               <a:rPr lang="en-GB" smtClean="0"/>
-              <a:t>22/07/2023</a:t>
+              <a:t>24/07/2023</a:t>
             </a:fld>
             <a:endParaRPr lang="en-GB"/>
           </a:p>
@@ -3043,7 +3043,7 @@
           <a:p>
             <a:fld id="{B3CC3E4E-7464-425B-BD5C-16AB80441681}" type="datetimeFigureOut">
               <a:rPr lang="en-GB" smtClean="0"/>
-              <a:t>22/07/2023</a:t>
+              <a:t>24/07/2023</a:t>
             </a:fld>
             <a:endParaRPr lang="en-GB"/>
           </a:p>
@@ -3185,7 +3185,7 @@
           <a:p>
             <a:fld id="{B3CC3E4E-7464-425B-BD5C-16AB80441681}" type="datetimeFigureOut">
               <a:rPr lang="en-GB" smtClean="0"/>
-              <a:t>22/07/2023</a:t>
+              <a:t>24/07/2023</a:t>
             </a:fld>
             <a:endParaRPr lang="en-GB"/>
           </a:p>
@@ -3298,7 +3298,7 @@
           <a:p>
             <a:fld id="{B3CC3E4E-7464-425B-BD5C-16AB80441681}" type="datetimeFigureOut">
               <a:rPr lang="en-GB" smtClean="0"/>
-              <a:t>22/07/2023</a:t>
+              <a:t>24/07/2023</a:t>
             </a:fld>
             <a:endParaRPr lang="en-GB"/>
           </a:p>
@@ -3611,7 +3611,7 @@
           <a:p>
             <a:fld id="{B3CC3E4E-7464-425B-BD5C-16AB80441681}" type="datetimeFigureOut">
               <a:rPr lang="en-GB" smtClean="0"/>
-              <a:t>22/07/2023</a:t>
+              <a:t>24/07/2023</a:t>
             </a:fld>
             <a:endParaRPr lang="en-GB"/>
           </a:p>
@@ -3900,7 +3900,7 @@
           <a:p>
             <a:fld id="{B3CC3E4E-7464-425B-BD5C-16AB80441681}" type="datetimeFigureOut">
               <a:rPr lang="en-GB" smtClean="0"/>
-              <a:t>22/07/2023</a:t>
+              <a:t>24/07/2023</a:t>
             </a:fld>
             <a:endParaRPr lang="en-GB"/>
           </a:p>
@@ -4143,7 +4143,7 @@
           <a:p>
             <a:fld id="{B3CC3E4E-7464-425B-BD5C-16AB80441681}" type="datetimeFigureOut">
               <a:rPr lang="en-GB" smtClean="0"/>
-              <a:t>22/07/2023</a:t>
+              <a:t>24/07/2023</a:t>
             </a:fld>
             <a:endParaRPr lang="en-GB"/>
           </a:p>
@@ -7608,7 +7608,15 @@
             <a:pPr lvl="1"/>
             <a:r>
               <a:rPr lang="en-GB" sz="2200" dirty="0"/>
-              <a:t>Every 1 year older = 0.042 drop in loyalty points</a:t>
+              <a:t>Every 1 year older </a:t>
+            </a:r>
+            <a:r>
+              <a:rPr lang="en-GB" sz="2200"/>
+              <a:t>= 4.2 </a:t>
+            </a:r>
+            <a:r>
+              <a:rPr lang="en-GB" sz="2200" dirty="0"/>
+              <a:t>drop in loyalty points</a:t>
             </a:r>
           </a:p>
           <a:p>

</xml_diff>